<commit_message>
removed header from svg
</commit_message>
<xml_diff>
--- a/Communication/Demo Slides/Demo 14-09-2018 Capricornus.pptx
+++ b/Communication/Demo Slides/Demo 14-09-2018 Capricornus.pptx
@@ -241,7 +241,7 @@
             <a:fld id="{86C988DC-9DE3-4390-97AB-D61B85DACE57}" type="datetimeFigureOut">
               <a:rPr lang="pt-PT" sz="900" smtClean="0"/>
               <a:pPr/>
-              <a:t>12/09/2018</a:t>
+              <a:t>13/09/2018</a:t>
             </a:fld>
             <a:endParaRPr lang="pt-PT" sz="900"/>
           </a:p>
@@ -420,7 +420,7 @@
             <a:fld id="{0835B8F7-DAC4-4931-8AED-4356A8B2FD64}" type="datetimeFigureOut">
               <a:rPr lang="pt-BR" smtClean="0"/>
               <a:pPr/>
-              <a:t>12/09/2018</a:t>
+              <a:t>13/09/2018</a:t>
             </a:fld>
             <a:endParaRPr lang="pt-BR"/>
           </a:p>
@@ -802,7 +802,7 @@
           <a:graphicData uri="http://schemas.openxmlformats.org/presentationml/2006/ole">
             <mc:AlternateContent xmlns:mc="http://schemas.openxmlformats.org/markup-compatibility/2006">
               <mc:Choice xmlns:v="urn:schemas-microsoft-com:vml" Requires="v">
-                <p:oleObj spid="_x0000_s28725" name="think-cell Slide" r:id="rId4" imgW="270" imgH="270" progId="TCLayout.ActiveDocument.1">
+                <p:oleObj spid="_x0000_s28726" name="think-cell Slide" r:id="rId4" imgW="270" imgH="270" progId="TCLayout.ActiveDocument.1">
                   <p:embed/>
                 </p:oleObj>
               </mc:Choice>
@@ -2700,7 +2700,7 @@
           <a:graphicData uri="http://schemas.openxmlformats.org/presentationml/2006/ole">
             <mc:AlternateContent xmlns:mc="http://schemas.openxmlformats.org/markup-compatibility/2006">
               <mc:Choice xmlns:v="urn:schemas-microsoft-com:vml" Requires="v">
-                <p:oleObj spid="_x0000_s26675" name="think-cell Slide" r:id="rId4" imgW="270" imgH="270" progId="TCLayout.ActiveDocument.1">
+                <p:oleObj spid="_x0000_s26676" name="think-cell Slide" r:id="rId4" imgW="270" imgH="270" progId="TCLayout.ActiveDocument.1">
                   <p:embed/>
                 </p:oleObj>
               </mc:Choice>
@@ -4746,7 +4746,7 @@
           <a:graphicData uri="http://schemas.openxmlformats.org/presentationml/2006/ole">
             <mc:AlternateContent xmlns:mc="http://schemas.openxmlformats.org/markup-compatibility/2006">
               <mc:Choice xmlns:v="urn:schemas-microsoft-com:vml" Requires="v">
-                <p:oleObj spid="_x0000_s27698" name="think-cell Slide" r:id="rId4" imgW="270" imgH="270" progId="TCLayout.ActiveDocument.1">
+                <p:oleObj spid="_x0000_s27699" name="think-cell Slide" r:id="rId4" imgW="270" imgH="270" progId="TCLayout.ActiveDocument.1">
                   <p:embed/>
                 </p:oleObj>
               </mc:Choice>
@@ -6939,7 +6939,7 @@
           </a:ln>
           <a:extLst>
             <a:ext uri="{91240B29-F687-4f45-9708-019B960494DF}">
-              <a14:hiddenLine xmlns="" xmlns:a14="http://schemas.microsoft.com/office/drawing/2010/main" w="9525">
+              <a14:hiddenLine xmlns:a14="http://schemas.microsoft.com/office/drawing/2010/main" xmlns="" w="9525">
                 <a:solidFill>
                   <a:srgbClr val="000000"/>
                 </a:solidFill>
@@ -7111,7 +7111,7 @@
             </a:ln>
             <a:extLst>
               <a:ext uri="{91240B29-F687-4f45-9708-019B960494DF}">
-                <a14:hiddenLine xmlns="" xmlns:a14="http://schemas.microsoft.com/office/drawing/2010/main" w="9525">
+                <a14:hiddenLine xmlns:a14="http://schemas.microsoft.com/office/drawing/2010/main" xmlns="" w="9525">
                   <a:solidFill>
                     <a:srgbClr val="000000"/>
                   </a:solidFill>
@@ -7292,7 +7292,7 @@
             </a:ln>
             <a:extLst>
               <a:ext uri="{91240B29-F687-4f45-9708-019B960494DF}">
-                <a14:hiddenLine xmlns="" xmlns:a14="http://schemas.microsoft.com/office/drawing/2010/main" w="9525">
+                <a14:hiddenLine xmlns:a14="http://schemas.microsoft.com/office/drawing/2010/main" xmlns="" w="9525">
                   <a:solidFill>
                     <a:srgbClr val="000000"/>
                   </a:solidFill>
@@ -8100,7 +8100,7 @@
             </a:ln>
             <a:extLst>
               <a:ext uri="{91240B29-F687-4f45-9708-019B960494DF}">
-                <a14:hiddenLine xmlns:a14="http://schemas.microsoft.com/office/drawing/2010/main" xmlns="" w="9525">
+                <a14:hiddenLine xmlns="" xmlns:a14="http://schemas.microsoft.com/office/drawing/2010/main" w="9525">
                   <a:solidFill>
                     <a:srgbClr val="000000"/>
                   </a:solidFill>
@@ -8481,7 +8481,7 @@
             </a:ln>
             <a:extLst>
               <a:ext uri="{91240B29-F687-4f45-9708-019B960494DF}">
-                <a14:hiddenLine xmlns:a14="http://schemas.microsoft.com/office/drawing/2010/main" xmlns="" w="9525">
+                <a14:hiddenLine xmlns="" xmlns:a14="http://schemas.microsoft.com/office/drawing/2010/main" w="9525">
                   <a:solidFill>
                     <a:srgbClr val="000000"/>
                   </a:solidFill>
@@ -8794,7 +8794,7 @@
             </a:ln>
             <a:extLst>
               <a:ext uri="{91240B29-F687-4f45-9708-019B960494DF}">
-                <a14:hiddenLine xmlns:a14="http://schemas.microsoft.com/office/drawing/2010/main" xmlns="" w="9525">
+                <a14:hiddenLine xmlns="" xmlns:a14="http://schemas.microsoft.com/office/drawing/2010/main" w="9525">
                   <a:solidFill>
                     <a:srgbClr val="000000"/>
                   </a:solidFill>
@@ -9107,7 +9107,7 @@
             </a:ln>
             <a:extLst>
               <a:ext uri="{91240B29-F687-4f45-9708-019B960494DF}">
-                <a14:hiddenLine xmlns:a14="http://schemas.microsoft.com/office/drawing/2010/main" xmlns="" w="9525">
+                <a14:hiddenLine xmlns="" xmlns:a14="http://schemas.microsoft.com/office/drawing/2010/main" w="9525">
                   <a:solidFill>
                     <a:srgbClr val="000000"/>
                   </a:solidFill>
@@ -9289,7 +9289,7 @@
             </a:ln>
             <a:extLst>
               <a:ext uri="{91240B29-F687-4f45-9708-019B960494DF}">
-                <a14:hiddenLine xmlns:a14="http://schemas.microsoft.com/office/drawing/2010/main" xmlns="" w="9525">
+                <a14:hiddenLine xmlns="" xmlns:a14="http://schemas.microsoft.com/office/drawing/2010/main" w="9525">
                   <a:solidFill>
                     <a:srgbClr val="000000"/>
                   </a:solidFill>
@@ -9670,7 +9670,7 @@
             </a:ln>
             <a:extLst>
               <a:ext uri="{91240B29-F687-4f45-9708-019B960494DF}">
-                <a14:hiddenLine xmlns:a14="http://schemas.microsoft.com/office/drawing/2010/main" xmlns="" w="9525">
+                <a14:hiddenLine xmlns="" xmlns:a14="http://schemas.microsoft.com/office/drawing/2010/main" w="9525">
                   <a:solidFill>
                     <a:srgbClr val="000000"/>
                   </a:solidFill>
@@ -10042,7 +10042,7 @@
             </a:ln>
             <a:extLst>
               <a:ext uri="{91240B29-F687-4f45-9708-019B960494DF}">
-                <a14:hiddenLine xmlns:a14="http://schemas.microsoft.com/office/drawing/2010/main" xmlns="" w="9525">
+                <a14:hiddenLine xmlns="" xmlns:a14="http://schemas.microsoft.com/office/drawing/2010/main" w="9525">
                   <a:solidFill>
                     <a:srgbClr val="000000"/>
                   </a:solidFill>
@@ -10485,7 +10485,7 @@
             </a:ln>
             <a:extLst>
               <a:ext uri="{91240B29-F687-4f45-9708-019B960494DF}">
-                <a14:hiddenLine xmlns:a14="http://schemas.microsoft.com/office/drawing/2010/main" xmlns="" w="9525">
+                <a14:hiddenLine xmlns="" xmlns:a14="http://schemas.microsoft.com/office/drawing/2010/main" w="9525">
                   <a:solidFill>
                     <a:srgbClr val="000000"/>
                   </a:solidFill>
@@ -10727,7 +10727,7 @@
             </a:ln>
             <a:extLst>
               <a:ext uri="{91240B29-F687-4f45-9708-019B960494DF}">
-                <a14:hiddenLine xmlns:a14="http://schemas.microsoft.com/office/drawing/2010/main" xmlns="" w="9525">
+                <a14:hiddenLine xmlns="" xmlns:a14="http://schemas.microsoft.com/office/drawing/2010/main" w="9525">
                   <a:solidFill>
                     <a:srgbClr val="000000"/>
                   </a:solidFill>
@@ -10969,7 +10969,7 @@
             </a:ln>
             <a:extLst>
               <a:ext uri="{91240B29-F687-4f45-9708-019B960494DF}">
-                <a14:hiddenLine xmlns:a14="http://schemas.microsoft.com/office/drawing/2010/main" xmlns="" w="9525">
+                <a14:hiddenLine xmlns="" xmlns:a14="http://schemas.microsoft.com/office/drawing/2010/main" w="9525">
                   <a:solidFill>
                     <a:srgbClr val="000000"/>
                   </a:solidFill>
@@ -11350,7 +11350,7 @@
             </a:ln>
             <a:extLst>
               <a:ext uri="{91240B29-F687-4f45-9708-019B960494DF}">
-                <a14:hiddenLine xmlns:a14="http://schemas.microsoft.com/office/drawing/2010/main" xmlns="" w="9525">
+                <a14:hiddenLine xmlns="" xmlns:a14="http://schemas.microsoft.com/office/drawing/2010/main" w="9525">
                   <a:solidFill>
                     <a:srgbClr val="000000"/>
                   </a:solidFill>
@@ -11552,7 +11552,7 @@
             </a:ln>
             <a:extLst>
               <a:ext uri="{91240B29-F687-4f45-9708-019B960494DF}">
-                <a14:hiddenLine xmlns:a14="http://schemas.microsoft.com/office/drawing/2010/main" xmlns="" w="9525">
+                <a14:hiddenLine xmlns="" xmlns:a14="http://schemas.microsoft.com/office/drawing/2010/main" w="9525">
                   <a:solidFill>
                     <a:srgbClr val="000000"/>
                   </a:solidFill>
@@ -11714,7 +11714,7 @@
             </a:ln>
             <a:extLst>
               <a:ext uri="{91240B29-F687-4f45-9708-019B960494DF}">
-                <a14:hiddenLine xmlns:a14="http://schemas.microsoft.com/office/drawing/2010/main" xmlns="" w="9525">
+                <a14:hiddenLine xmlns="" xmlns:a14="http://schemas.microsoft.com/office/drawing/2010/main" w="9525">
                   <a:solidFill>
                     <a:srgbClr val="000000"/>
                   </a:solidFill>
@@ -11916,7 +11916,7 @@
             </a:ln>
             <a:extLst>
               <a:ext uri="{91240B29-F687-4f45-9708-019B960494DF}">
-                <a14:hiddenLine xmlns:a14="http://schemas.microsoft.com/office/drawing/2010/main" xmlns="" w="9525">
+                <a14:hiddenLine xmlns="" xmlns:a14="http://schemas.microsoft.com/office/drawing/2010/main" w="9525">
                   <a:solidFill>
                     <a:srgbClr val="000000"/>
                   </a:solidFill>
@@ -12297,7 +12297,7 @@
             </a:ln>
             <a:extLst>
               <a:ext uri="{91240B29-F687-4f45-9708-019B960494DF}">
-                <a14:hiddenLine xmlns:a14="http://schemas.microsoft.com/office/drawing/2010/main" xmlns="" w="9525">
+                <a14:hiddenLine xmlns="" xmlns:a14="http://schemas.microsoft.com/office/drawing/2010/main" w="9525">
                   <a:solidFill>
                     <a:srgbClr val="000000"/>
                   </a:solidFill>
@@ -12681,7 +12681,7 @@
             </a:ln>
             <a:extLst>
               <a:ext uri="{91240B29-F687-4f45-9708-019B960494DF}">
-                <a14:hiddenLine xmlns:a14="http://schemas.microsoft.com/office/drawing/2010/main" xmlns="" w="9525">
+                <a14:hiddenLine xmlns="" xmlns:a14="http://schemas.microsoft.com/office/drawing/2010/main" w="9525">
                   <a:solidFill>
                     <a:srgbClr val="000000"/>
                   </a:solidFill>
@@ -12903,7 +12903,7 @@
             </a:ln>
             <a:extLst>
               <a:ext uri="{91240B29-F687-4f45-9708-019B960494DF}">
-                <a14:hiddenLine xmlns:a14="http://schemas.microsoft.com/office/drawing/2010/main" xmlns="" w="9525">
+                <a14:hiddenLine xmlns="" xmlns:a14="http://schemas.microsoft.com/office/drawing/2010/main" w="9525">
                   <a:solidFill>
                     <a:srgbClr val="000000"/>
                   </a:solidFill>
@@ -13085,7 +13085,7 @@
             </a:ln>
             <a:extLst>
               <a:ext uri="{91240B29-F687-4f45-9708-019B960494DF}">
-                <a14:hiddenLine xmlns:a14="http://schemas.microsoft.com/office/drawing/2010/main" xmlns="" w="9525">
+                <a14:hiddenLine xmlns="" xmlns:a14="http://schemas.microsoft.com/office/drawing/2010/main" w="9525">
                   <a:solidFill>
                     <a:srgbClr val="000000"/>
                   </a:solidFill>
@@ -13327,7 +13327,7 @@
             </a:ln>
             <a:extLst>
               <a:ext uri="{91240B29-F687-4f45-9708-019B960494DF}">
-                <a14:hiddenLine xmlns:a14="http://schemas.microsoft.com/office/drawing/2010/main" xmlns="" w="9525">
+                <a14:hiddenLine xmlns="" xmlns:a14="http://schemas.microsoft.com/office/drawing/2010/main" w="9525">
                   <a:solidFill>
                     <a:srgbClr val="000000"/>
                   </a:solidFill>
@@ -13711,7 +13711,7 @@
             </a:ln>
             <a:extLst>
               <a:ext uri="{91240B29-F687-4f45-9708-019B960494DF}">
-                <a14:hiddenLine xmlns:a14="http://schemas.microsoft.com/office/drawing/2010/main" xmlns="" w="9525">
+                <a14:hiddenLine xmlns="" xmlns:a14="http://schemas.microsoft.com/office/drawing/2010/main" w="9525">
                   <a:solidFill>
                     <a:srgbClr val="000000"/>
                   </a:solidFill>
@@ -13985,7 +13985,7 @@
             </a:ln>
             <a:extLst>
               <a:ext uri="{91240B29-F687-4f45-9708-019B960494DF}">
-                <a14:hiddenLine xmlns:a14="http://schemas.microsoft.com/office/drawing/2010/main" xmlns="" w="9525">
+                <a14:hiddenLine xmlns="" xmlns:a14="http://schemas.microsoft.com/office/drawing/2010/main" w="9525">
                   <a:solidFill>
                     <a:srgbClr val="000000"/>
                   </a:solidFill>
@@ -14298,7 +14298,7 @@
             </a:ln>
             <a:extLst>
               <a:ext uri="{91240B29-F687-4f45-9708-019B960494DF}">
-                <a14:hiddenLine xmlns:a14="http://schemas.microsoft.com/office/drawing/2010/main" xmlns="" w="9525">
+                <a14:hiddenLine xmlns="" xmlns:a14="http://schemas.microsoft.com/office/drawing/2010/main" w="9525">
                   <a:solidFill>
                     <a:srgbClr val="000000"/>
                   </a:solidFill>
@@ -14520,7 +14520,7 @@
             </a:ln>
             <a:extLst>
               <a:ext uri="{91240B29-F687-4f45-9708-019B960494DF}">
-                <a14:hiddenLine xmlns:a14="http://schemas.microsoft.com/office/drawing/2010/main" xmlns="" w="9525">
+                <a14:hiddenLine xmlns="" xmlns:a14="http://schemas.microsoft.com/office/drawing/2010/main" w="9525">
                   <a:solidFill>
                     <a:srgbClr val="000000"/>
                   </a:solidFill>
@@ -14762,7 +14762,7 @@
             </a:ln>
             <a:extLst>
               <a:ext uri="{91240B29-F687-4f45-9708-019B960494DF}">
-                <a14:hiddenLine xmlns:a14="http://schemas.microsoft.com/office/drawing/2010/main" xmlns="" w="9525">
+                <a14:hiddenLine xmlns="" xmlns:a14="http://schemas.microsoft.com/office/drawing/2010/main" w="9525">
                   <a:solidFill>
                     <a:srgbClr val="000000"/>
                   </a:solidFill>
@@ -15004,7 +15004,7 @@
             </a:ln>
             <a:extLst>
               <a:ext uri="{91240B29-F687-4f45-9708-019B960494DF}">
-                <a14:hiddenLine xmlns:a14="http://schemas.microsoft.com/office/drawing/2010/main" xmlns="" w="9525">
+                <a14:hiddenLine xmlns="" xmlns:a14="http://schemas.microsoft.com/office/drawing/2010/main" w="9525">
                   <a:solidFill>
                     <a:srgbClr val="000000"/>
                   </a:solidFill>
@@ -15148,7 +15148,7 @@
             </a:ln>
             <a:extLst>
               <a:ext uri="{91240B29-F687-4f45-9708-019B960494DF}">
-                <a14:hiddenLine xmlns:a14="http://schemas.microsoft.com/office/drawing/2010/main" xmlns="" w="9525">
+                <a14:hiddenLine xmlns="" xmlns:a14="http://schemas.microsoft.com/office/drawing/2010/main" w="9525">
                   <a:solidFill>
                     <a:srgbClr val="000000"/>
                   </a:solidFill>
@@ -17582,7 +17582,7 @@
           <a:graphicData uri="http://schemas.openxmlformats.org/presentationml/2006/ole">
             <mc:AlternateContent xmlns:mc="http://schemas.openxmlformats.org/markup-compatibility/2006">
               <mc:Choice xmlns:v="urn:schemas-microsoft-com:vml" Requires="v">
-                <p:oleObj spid="_x0000_s21558" name="think-cell Slide" r:id="rId4" imgW="270" imgH="270" progId="TCLayout.ActiveDocument.1">
+                <p:oleObj spid="_x0000_s21559" name="think-cell Slide" r:id="rId4" imgW="270" imgH="270" progId="TCLayout.ActiveDocument.1">
                   <p:embed/>
                 </p:oleObj>
               </mc:Choice>
@@ -18051,7 +18051,7 @@
           <a:graphicData uri="http://schemas.openxmlformats.org/presentationml/2006/ole">
             <mc:AlternateContent xmlns:mc="http://schemas.openxmlformats.org/markup-compatibility/2006">
               <mc:Choice xmlns:v="urn:schemas-microsoft-com:vml" Requires="v">
-                <p:oleObj spid="_x0000_s9265" name="think-cell Slide" r:id="rId4" imgW="270" imgH="270" progId="TCLayout.ActiveDocument.1">
+                <p:oleObj spid="_x0000_s9266" name="think-cell Slide" r:id="rId4" imgW="270" imgH="270" progId="TCLayout.ActiveDocument.1">
                   <p:embed/>
                 </p:oleObj>
               </mc:Choice>
@@ -18173,7 +18173,7 @@
           <a:graphicData uri="http://schemas.openxmlformats.org/presentationml/2006/ole">
             <mc:AlternateContent xmlns:mc="http://schemas.openxmlformats.org/markup-compatibility/2006">
               <mc:Choice xmlns:v="urn:schemas-microsoft-com:vml" Requires="v">
-                <p:oleObj spid="_x0000_s64546" name="think-cell Slide" r:id="rId4" imgW="270" imgH="270" progId="TCLayout.ActiveDocument.1">
+                <p:oleObj spid="_x0000_s64547" name="think-cell Slide" r:id="rId4" imgW="270" imgH="270" progId="TCLayout.ActiveDocument.1">
                   <p:embed/>
                 </p:oleObj>
               </mc:Choice>
@@ -18983,7 +18983,7 @@
           <a:graphicData uri="http://schemas.openxmlformats.org/presentationml/2006/ole">
             <mc:AlternateContent xmlns:mc="http://schemas.openxmlformats.org/markup-compatibility/2006">
               <mc:Choice xmlns:v="urn:schemas-microsoft-com:vml" Requires="v">
-                <p:oleObj spid="_x0000_s25651" name="think-cell Slide" r:id="rId4" imgW="270" imgH="270" progId="TCLayout.ActiveDocument.1">
+                <p:oleObj spid="_x0000_s25652" name="think-cell Slide" r:id="rId4" imgW="270" imgH="270" progId="TCLayout.ActiveDocument.1">
                   <p:embed/>
                 </p:oleObj>
               </mc:Choice>
@@ -20976,7 +20976,7 @@
           <a:graphicData uri="http://schemas.openxmlformats.org/presentationml/2006/ole">
             <mc:AlternateContent xmlns:mc="http://schemas.openxmlformats.org/markup-compatibility/2006">
               <mc:Choice xmlns:v="urn:schemas-microsoft-com:vml" Requires="v">
-                <p:oleObj spid="_x0000_s4152" name="think-cell Slide" r:id="rId12" imgW="270" imgH="270" progId="TCLayout.ActiveDocument.1">
+                <p:oleObj spid="_x0000_s4153" name="think-cell Slide" r:id="rId12" imgW="270" imgH="270" progId="TCLayout.ActiveDocument.1">
                   <p:embed/>
                 </p:oleObj>
               </mc:Choice>
@@ -23414,7 +23414,7 @@
           <a:graphicData uri="http://schemas.openxmlformats.org/presentationml/2006/ole">
             <mc:AlternateContent xmlns:mc="http://schemas.openxmlformats.org/markup-compatibility/2006">
               <mc:Choice xmlns:v="urn:schemas-microsoft-com:vml" Requires="v">
-                <p:oleObj spid="_x0000_s24630" name="think-cell Slide" r:id="rId8" imgW="270" imgH="270" progId="TCLayout.ActiveDocument.1">
+                <p:oleObj spid="_x0000_s24631" name="think-cell Slide" r:id="rId8" imgW="270" imgH="270" progId="TCLayout.ActiveDocument.1">
                   <p:embed/>
                 </p:oleObj>
               </mc:Choice>
@@ -24147,7 +24147,7 @@
           <a:graphicData uri="http://schemas.openxmlformats.org/presentationml/2006/ole">
             <mc:AlternateContent xmlns:mc="http://schemas.openxmlformats.org/markup-compatibility/2006">
               <mc:Choice xmlns:v="urn:schemas-microsoft-com:vml" Requires="v">
-                <p:oleObj spid="_x0000_s29747" name="think-cell Slide" r:id="rId6" imgW="270" imgH="270" progId="TCLayout.ActiveDocument.1">
+                <p:oleObj spid="_x0000_s29748" name="think-cell Slide" r:id="rId6" imgW="270" imgH="270" progId="TCLayout.ActiveDocument.1">
                   <p:embed/>
                 </p:oleObj>
               </mc:Choice>
@@ -24617,13 +24617,13 @@
   <p:clrMapOvr>
     <a:masterClrMapping/>
   </p:clrMapOvr>
-  <mc:AlternateContent xmlns:mc="http://schemas.openxmlformats.org/markup-compatibility/2006">
-    <mc:Choice xmlns:p14="http://schemas.microsoft.com/office/powerpoint/2010/main" Requires="p14">
+  <mc:AlternateContent xmlns:mc="http://schemas.openxmlformats.org/markup-compatibility/2006" xmlns:p14="http://schemas.microsoft.com/office/powerpoint/2010/main">
+    <mc:Choice Requires="p14">
       <p:transition spd="med" p14:dur="700">
         <p:fade/>
       </p:transition>
     </mc:Choice>
-    <mc:Fallback>
+    <mc:Fallback xmlns="">
       <p:transition spd="med">
         <p:fade/>
       </p:transition>
@@ -25094,7 +25094,7 @@
           </p:cNvPicPr>
           <p:nvPr/>
         </p:nvPicPr>
-        <p:blipFill>
+        <p:blipFill rotWithShape="1">
           <a:blip r:embed="rId2">
             <a:extLst>
               <a:ext uri="{28A0092B-C50C-407E-A947-70E740481C1C}">
@@ -25105,14 +25105,13 @@
               </a:ext>
             </a:extLst>
           </a:blip>
-          <a:stretch>
-            <a:fillRect/>
-          </a:stretch>
+          <a:srcRect t="6300"/>
+          <a:stretch/>
         </p:blipFill>
         <p:spPr>
           <a:xfrm>
-            <a:off x="0" y="836712"/>
-            <a:ext cx="8875059" cy="6858000"/>
+            <a:off x="0" y="1268760"/>
+            <a:ext cx="8875059" cy="6425952"/>
           </a:xfrm>
           <a:prstGeom prst="rect">
             <a:avLst/>
@@ -25286,7 +25285,7 @@
           </p:cNvPicPr>
           <p:nvPr/>
         </p:nvPicPr>
-        <p:blipFill>
+        <p:blipFill rotWithShape="1">
           <a:blip r:embed="rId2">
             <a:extLst>
               <a:ext uri="{28A0092B-C50C-407E-A947-70E740481C1C}">
@@ -25297,14 +25296,13 @@
               </a:ext>
             </a:extLst>
           </a:blip>
-          <a:stretch>
-            <a:fillRect/>
-          </a:stretch>
+          <a:srcRect t="7349"/>
+          <a:stretch/>
         </p:blipFill>
         <p:spPr>
           <a:xfrm>
-            <a:off x="0" y="836712"/>
-            <a:ext cx="8875059" cy="6858000"/>
+            <a:off x="0" y="1340768"/>
+            <a:ext cx="8875059" cy="6353944"/>
           </a:xfrm>
           <a:prstGeom prst="rect">
             <a:avLst/>
@@ -25486,7 +25484,7 @@
           </p:cNvPicPr>
           <p:nvPr/>
         </p:nvPicPr>
-        <p:blipFill>
+        <p:blipFill rotWithShape="1">
           <a:blip r:embed="rId2">
             <a:extLst>
               <a:ext uri="{28A0092B-C50C-407E-A947-70E740481C1C}">
@@ -25497,14 +25495,13 @@
               </a:ext>
             </a:extLst>
           </a:blip>
-          <a:stretch>
-            <a:fillRect/>
-          </a:stretch>
+          <a:srcRect t="6300"/>
+          <a:stretch/>
         </p:blipFill>
         <p:spPr>
           <a:xfrm>
-            <a:off x="0" y="836712"/>
-            <a:ext cx="8875059" cy="6858000"/>
+            <a:off x="0" y="1268760"/>
+            <a:ext cx="8875059" cy="6425952"/>
           </a:xfrm>
           <a:prstGeom prst="rect">
             <a:avLst/>

</xml_diff>